<commit_message>
adding mockup for adminpage and loggedissues
</commit_message>
<xml_diff>
--- a/specs/Booking_workflow.pptx
+++ b/specs/Booking_workflow.pptx
@@ -266,7 +266,7 @@
           <a:p>
             <a:fld id="{23CD534F-1FFA-40D8-B07B-95F13BAB3825}" type="datetimeFigureOut">
               <a:rPr lang="en-GB" smtClean="0"/>
-              <a:t>06/02/2018</a:t>
+              <a:t>09/02/2018</a:t>
             </a:fld>
             <a:endParaRPr lang="en-GB"/>
           </a:p>
@@ -466,7 +466,7 @@
           <a:p>
             <a:fld id="{23CD534F-1FFA-40D8-B07B-95F13BAB3825}" type="datetimeFigureOut">
               <a:rPr lang="en-GB" smtClean="0"/>
-              <a:t>06/02/2018</a:t>
+              <a:t>09/02/2018</a:t>
             </a:fld>
             <a:endParaRPr lang="en-GB"/>
           </a:p>
@@ -676,7 +676,7 @@
           <a:p>
             <a:fld id="{23CD534F-1FFA-40D8-B07B-95F13BAB3825}" type="datetimeFigureOut">
               <a:rPr lang="en-GB" smtClean="0"/>
-              <a:t>06/02/2018</a:t>
+              <a:t>09/02/2018</a:t>
             </a:fld>
             <a:endParaRPr lang="en-GB"/>
           </a:p>
@@ -876,7 +876,7 @@
           <a:p>
             <a:fld id="{23CD534F-1FFA-40D8-B07B-95F13BAB3825}" type="datetimeFigureOut">
               <a:rPr lang="en-GB" smtClean="0"/>
-              <a:t>06/02/2018</a:t>
+              <a:t>09/02/2018</a:t>
             </a:fld>
             <a:endParaRPr lang="en-GB"/>
           </a:p>
@@ -1152,7 +1152,7 @@
           <a:p>
             <a:fld id="{23CD534F-1FFA-40D8-B07B-95F13BAB3825}" type="datetimeFigureOut">
               <a:rPr lang="en-GB" smtClean="0"/>
-              <a:t>06/02/2018</a:t>
+              <a:t>09/02/2018</a:t>
             </a:fld>
             <a:endParaRPr lang="en-GB"/>
           </a:p>
@@ -1420,7 +1420,7 @@
           <a:p>
             <a:fld id="{23CD534F-1FFA-40D8-B07B-95F13BAB3825}" type="datetimeFigureOut">
               <a:rPr lang="en-GB" smtClean="0"/>
-              <a:t>06/02/2018</a:t>
+              <a:t>09/02/2018</a:t>
             </a:fld>
             <a:endParaRPr lang="en-GB"/>
           </a:p>
@@ -1835,7 +1835,7 @@
           <a:p>
             <a:fld id="{23CD534F-1FFA-40D8-B07B-95F13BAB3825}" type="datetimeFigureOut">
               <a:rPr lang="en-GB" smtClean="0"/>
-              <a:t>06/02/2018</a:t>
+              <a:t>09/02/2018</a:t>
             </a:fld>
             <a:endParaRPr lang="en-GB"/>
           </a:p>
@@ -1977,7 +1977,7 @@
           <a:p>
             <a:fld id="{23CD534F-1FFA-40D8-B07B-95F13BAB3825}" type="datetimeFigureOut">
               <a:rPr lang="en-GB" smtClean="0"/>
-              <a:t>06/02/2018</a:t>
+              <a:t>09/02/2018</a:t>
             </a:fld>
             <a:endParaRPr lang="en-GB"/>
           </a:p>
@@ -2090,7 +2090,7 @@
           <a:p>
             <a:fld id="{23CD534F-1FFA-40D8-B07B-95F13BAB3825}" type="datetimeFigureOut">
               <a:rPr lang="en-GB" smtClean="0"/>
-              <a:t>06/02/2018</a:t>
+              <a:t>09/02/2018</a:t>
             </a:fld>
             <a:endParaRPr lang="en-GB"/>
           </a:p>
@@ -2403,7 +2403,7 @@
           <a:p>
             <a:fld id="{23CD534F-1FFA-40D8-B07B-95F13BAB3825}" type="datetimeFigureOut">
               <a:rPr lang="en-GB" smtClean="0"/>
-              <a:t>06/02/2018</a:t>
+              <a:t>09/02/2018</a:t>
             </a:fld>
             <a:endParaRPr lang="en-GB"/>
           </a:p>
@@ -2692,7 +2692,7 @@
           <a:p>
             <a:fld id="{23CD534F-1FFA-40D8-B07B-95F13BAB3825}" type="datetimeFigureOut">
               <a:rPr lang="en-GB" smtClean="0"/>
-              <a:t>06/02/2018</a:t>
+              <a:t>09/02/2018</a:t>
             </a:fld>
             <a:endParaRPr lang="en-GB"/>
           </a:p>
@@ -2935,7 +2935,7 @@
           <a:p>
             <a:fld id="{23CD534F-1FFA-40D8-B07B-95F13BAB3825}" type="datetimeFigureOut">
               <a:rPr lang="en-GB" smtClean="0"/>
-              <a:t>06/02/2018</a:t>
+              <a:t>09/02/2018</a:t>
             </a:fld>
             <a:endParaRPr lang="en-GB"/>
           </a:p>
@@ -3441,7 +3441,14 @@
             <a:pPr algn="ctr"/>
             <a:r>
               <a:rPr lang="en-GB" dirty="0"/>
-              <a:t>Confirm Booking</a:t>
+              <a:t>Confirm Booking,</a:t>
+            </a:r>
+          </a:p>
+          <a:p>
+            <a:pPr algn="ctr"/>
+            <a:r>
+              <a:rPr lang="en-GB" dirty="0"/>
+              <a:t>Update calendar</a:t>
             </a:r>
           </a:p>
         </p:txBody>

</xml_diff>